<commit_message>
update the package building and  GUI slides
</commit_message>
<xml_diff>
--- a/R GUI building .pptx
+++ b/R GUI building .pptx
@@ -5,16 +5,18 @@
     <p:sldMasterId id="2147483648" r:id="rId1"/>
   </p:sldMasterIdLst>
   <p:notesMasterIdLst>
-    <p:notesMasterId r:id="rId9"/>
+    <p:notesMasterId r:id="rId11"/>
   </p:notesMasterIdLst>
   <p:sldIdLst>
     <p:sldId id="256" r:id="rId2"/>
     <p:sldId id="257" r:id="rId3"/>
     <p:sldId id="259" r:id="rId4"/>
-    <p:sldId id="260" r:id="rId5"/>
-    <p:sldId id="263" r:id="rId6"/>
-    <p:sldId id="264" r:id="rId7"/>
-    <p:sldId id="266" r:id="rId8"/>
+    <p:sldId id="267" r:id="rId5"/>
+    <p:sldId id="260" r:id="rId6"/>
+    <p:sldId id="268" r:id="rId7"/>
+    <p:sldId id="263" r:id="rId8"/>
+    <p:sldId id="264" r:id="rId9"/>
+    <p:sldId id="266" r:id="rId10"/>
   </p:sldIdLst>
   <p:sldSz cx="9144000" cy="6858000" type="screen4x3"/>
   <p:notesSz cx="6858000" cy="9144000"/>
@@ -198,7 +200,7 @@
           <a:p>
             <a:fld id="{CAD520FA-5E10-4676-B445-F73293872EE0}" type="datetimeFigureOut">
               <a:rPr lang="en-US" smtClean="0"/>
-              <a:t>10/14/2014</a:t>
+              <a:t>10/16/2014</a:t>
             </a:fld>
             <a:endParaRPr lang="en-US"/>
           </a:p>
@@ -774,9 +776,6 @@
             <a:endParaRPr lang="en-US" dirty="0" smtClean="0"/>
           </a:p>
           <a:p>
-            <a:endParaRPr lang="en-US" dirty="0" smtClean="0"/>
-          </a:p>
-          <a:p>
             <a:r>
               <a:rPr lang="en-US" dirty="0" smtClean="0"/>
               <a:t>R for Windows has</a:t>
@@ -811,9 +810,238 @@
             </a:r>
             <a:r>
               <a:rPr lang="en-US" dirty="0" smtClean="0"/>
-              <a:t>installations include the newer Tk libraries.</a:t>
-            </a:r>
-            <a:endParaRPr lang="en-US" dirty="0"/>
+              <a:t>installations include the newer Tk libraries</a:t>
+            </a:r>
+            <a:r>
+              <a:rPr lang="en-US" dirty="0" smtClean="0"/>
+              <a:t>.</a:t>
+            </a:r>
+          </a:p>
+          <a:p>
+            <a:endParaRPr lang="en-US" dirty="0" smtClean="0"/>
+          </a:p>
+          <a:p>
+            <a:r>
+              <a:rPr lang="en-US" sz="1200" b="0" i="0" u="none" strike="noStrike" kern="1200" baseline="0" dirty="0" smtClean="0">
+                <a:solidFill>
+                  <a:schemeClr val="tx1"/>
+                </a:solidFill>
+                <a:latin typeface="+mn-lt"/>
+                <a:ea typeface="+mn-ea"/>
+                <a:cs typeface="+mn-cs"/>
+              </a:rPr>
+              <a:t>The R manual pages simply redirect the reader to the original Tk documentation, hard to check the use of </a:t>
+            </a:r>
+            <a:r>
+              <a:rPr lang="en-US" sz="1200" b="0" i="0" u="none" strike="noStrike" kern="1200" baseline="0" dirty="0" err="1" smtClean="0">
+                <a:solidFill>
+                  <a:schemeClr val="tx1"/>
+                </a:solidFill>
+                <a:latin typeface="+mn-lt"/>
+                <a:ea typeface="+mn-ea"/>
+                <a:cs typeface="+mn-cs"/>
+              </a:rPr>
+              <a:t>tcltk</a:t>
+            </a:r>
+            <a:r>
+              <a:rPr lang="en-US" sz="1200" b="0" i="0" u="none" strike="noStrike" kern="1200" baseline="0" dirty="0" smtClean="0">
+                <a:solidFill>
+                  <a:schemeClr val="tx1"/>
+                </a:solidFill>
+                <a:latin typeface="+mn-lt"/>
+                <a:ea typeface="+mn-ea"/>
+                <a:cs typeface="+mn-cs"/>
+              </a:rPr>
+              <a:t>.</a:t>
+            </a:r>
+          </a:p>
+          <a:p>
+            <a:endParaRPr lang="en-US" dirty="0" smtClean="0"/>
+          </a:p>
+          <a:p>
+            <a:r>
+              <a:rPr lang="en-US" sz="1200" b="0" i="0" u="none" strike="noStrike" kern="1200" baseline="0" dirty="0" smtClean="0">
+                <a:solidFill>
+                  <a:schemeClr val="tx1"/>
+                </a:solidFill>
+                <a:latin typeface="+mn-lt"/>
+                <a:ea typeface="+mn-ea"/>
+                <a:cs typeface="+mn-cs"/>
+              </a:rPr>
+              <a:t>Tk has a well-documented API[10] (www.tcl.tk/man/tcl8.5). There are also several books to supplement. We consulted the one by Welch, Jones and Hobbs[1] often in the development of this material. The online sample chapter on geometry management of Walsh[13] was perused, as it provides</a:t>
+            </a:r>
+          </a:p>
+          <a:p>
+            <a:r>
+              <a:rPr lang="en-US" sz="1200" b="0" i="0" u="none" strike="noStrike" kern="1200" baseline="0" dirty="0" smtClean="0">
+                <a:solidFill>
+                  <a:schemeClr val="tx1"/>
+                </a:solidFill>
+                <a:latin typeface="+mn-lt"/>
+                <a:ea typeface="+mn-ea"/>
+                <a:cs typeface="+mn-cs"/>
+              </a:rPr>
+              <a:t>a thorough discussion of that topic. In addition, the Tk Tutorial of Mark </a:t>
+            </a:r>
+            <a:r>
+              <a:rPr lang="en-US" sz="1200" b="0" i="0" u="none" strike="noStrike" kern="1200" baseline="0" dirty="0" err="1" smtClean="0">
+                <a:solidFill>
+                  <a:schemeClr val="tx1"/>
+                </a:solidFill>
+                <a:latin typeface="+mn-lt"/>
+                <a:ea typeface="+mn-ea"/>
+                <a:cs typeface="+mn-cs"/>
+              </a:rPr>
+              <a:t>Roseman</a:t>
+            </a:r>
+            <a:r>
+              <a:rPr lang="en-US" sz="1200" b="0" i="0" u="none" strike="noStrike" kern="1200" baseline="0" dirty="0" smtClean="0">
+                <a:solidFill>
+                  <a:schemeClr val="tx1"/>
+                </a:solidFill>
+                <a:latin typeface="+mn-lt"/>
+                <a:ea typeface="+mn-ea"/>
+                <a:cs typeface="+mn-cs"/>
+              </a:rPr>
+              <a:t>[9] (www.tkdocs.com/tutorial) provides much detail. </a:t>
+            </a:r>
+            <a:r>
+              <a:rPr lang="en-US" sz="1200" b="0" i="0" u="none" strike="noStrike" kern="1200" baseline="0" dirty="0" err="1" smtClean="0">
+                <a:solidFill>
+                  <a:schemeClr val="tx1"/>
+                </a:solidFill>
+                <a:latin typeface="+mn-lt"/>
+                <a:ea typeface="+mn-ea"/>
+                <a:cs typeface="+mn-cs"/>
+              </a:rPr>
+              <a:t>Rspecific</a:t>
+            </a:r>
+            <a:endParaRPr lang="en-US" sz="1200" b="0" i="0" u="none" strike="noStrike" kern="1200" baseline="0" dirty="0" smtClean="0">
+              <a:solidFill>
+                <a:schemeClr val="tx1"/>
+              </a:solidFill>
+              <a:latin typeface="+mn-lt"/>
+              <a:ea typeface="+mn-ea"/>
+              <a:cs typeface="+mn-cs"/>
+            </a:endParaRPr>
+          </a:p>
+          <a:p>
+            <a:r>
+              <a:rPr lang="en-US" sz="1200" b="0" i="0" u="none" strike="noStrike" kern="1200" baseline="0" dirty="0" smtClean="0">
+                <a:solidFill>
+                  <a:schemeClr val="tx1"/>
+                </a:solidFill>
+                <a:latin typeface="+mn-lt"/>
+                <a:ea typeface="+mn-ea"/>
+                <a:cs typeface="+mn-cs"/>
+              </a:rPr>
+              <a:t>documentation includes two excellent R News articles and a proceedings paper[3][5][4] by Peter </a:t>
+            </a:r>
+            <a:r>
+              <a:rPr lang="en-US" sz="1200" b="0" i="0" u="none" strike="noStrike" kern="1200" baseline="0" dirty="0" err="1" smtClean="0">
+                <a:solidFill>
+                  <a:schemeClr val="tx1"/>
+                </a:solidFill>
+                <a:latin typeface="+mn-lt"/>
+                <a:ea typeface="+mn-ea"/>
+                <a:cs typeface="+mn-cs"/>
+              </a:rPr>
+              <a:t>Dalgaard</a:t>
+            </a:r>
+            <a:r>
+              <a:rPr lang="en-US" sz="1200" b="0" i="0" u="none" strike="noStrike" kern="1200" baseline="0" dirty="0" smtClean="0">
+                <a:solidFill>
+                  <a:schemeClr val="tx1"/>
+                </a:solidFill>
+                <a:latin typeface="+mn-lt"/>
+                <a:ea typeface="+mn-ea"/>
+                <a:cs typeface="+mn-cs"/>
+              </a:rPr>
+              <a:t>, the package author. A set of examples</a:t>
+            </a:r>
+          </a:p>
+          <a:p>
+            <a:r>
+              <a:rPr lang="en-US" sz="1200" b="0" i="0" u="none" strike="noStrike" kern="1200" baseline="0" dirty="0" smtClean="0">
+                <a:solidFill>
+                  <a:schemeClr val="tx1"/>
+                </a:solidFill>
+                <a:latin typeface="+mn-lt"/>
+                <a:ea typeface="+mn-ea"/>
+                <a:cs typeface="+mn-cs"/>
+              </a:rPr>
+              <a:t>by James </a:t>
+            </a:r>
+            <a:r>
+              <a:rPr lang="en-US" sz="1200" b="0" i="0" u="none" strike="noStrike" kern="1200" baseline="0" dirty="0" err="1" smtClean="0">
+                <a:solidFill>
+                  <a:schemeClr val="tx1"/>
+                </a:solidFill>
+                <a:latin typeface="+mn-lt"/>
+                <a:ea typeface="+mn-ea"/>
+                <a:cs typeface="+mn-cs"/>
+              </a:rPr>
+              <a:t>Wettenhall</a:t>
+            </a:r>
+            <a:r>
+              <a:rPr lang="en-US" sz="1200" b="0" i="0" u="none" strike="noStrike" kern="1200" baseline="0" dirty="0" smtClean="0">
+                <a:solidFill>
+                  <a:schemeClr val="tx1"/>
+                </a:solidFill>
+                <a:latin typeface="+mn-lt"/>
+                <a:ea typeface="+mn-ea"/>
+                <a:cs typeface="+mn-cs"/>
+              </a:rPr>
+              <a:t>[14] are also quite instructive. A main use of </a:t>
+            </a:r>
+            <a:r>
+              <a:rPr lang="en-US" sz="1200" b="0" i="0" u="none" strike="noStrike" kern="1200" baseline="0" dirty="0" err="1" smtClean="0">
+                <a:solidFill>
+                  <a:schemeClr val="tx1"/>
+                </a:solidFill>
+                <a:latin typeface="+mn-lt"/>
+                <a:ea typeface="+mn-ea"/>
+                <a:cs typeface="+mn-cs"/>
+              </a:rPr>
+              <a:t>tcltk</a:t>
+            </a:r>
+            <a:r>
+              <a:rPr lang="en-US" sz="1200" b="0" i="0" u="none" strike="noStrike" kern="1200" baseline="0" dirty="0" smtClean="0">
+                <a:solidFill>
+                  <a:schemeClr val="tx1"/>
+                </a:solidFill>
+                <a:latin typeface="+mn-lt"/>
+                <a:ea typeface="+mn-ea"/>
+                <a:cs typeface="+mn-cs"/>
+              </a:rPr>
+              <a:t> is within the </a:t>
+            </a:r>
+            <a:r>
+              <a:rPr lang="en-US" sz="1200" b="0" i="0" u="none" strike="noStrike" kern="1200" baseline="0" dirty="0" err="1" smtClean="0">
+                <a:solidFill>
+                  <a:schemeClr val="tx1"/>
+                </a:solidFill>
+                <a:latin typeface="+mn-lt"/>
+                <a:ea typeface="+mn-ea"/>
+                <a:cs typeface="+mn-cs"/>
+              </a:rPr>
+              <a:t>Rcmdr</a:t>
+            </a:r>
+            <a:r>
+              <a:rPr lang="en-US" sz="1200" b="0" i="0" u="none" strike="noStrike" kern="1200" baseline="0" dirty="0" smtClean="0">
+                <a:solidFill>
+                  <a:schemeClr val="tx1"/>
+                </a:solidFill>
+                <a:latin typeface="+mn-lt"/>
+                <a:ea typeface="+mn-ea"/>
+                <a:cs typeface="+mn-cs"/>
+              </a:rPr>
+              <a:t> framework. Writing extensions for that is well documented in an R News article[6] by John Fox, the package author.</a:t>
+            </a:r>
+            <a:endParaRPr lang="en-US" dirty="0" smtClean="0"/>
+          </a:p>
+          <a:p>
+            <a:endParaRPr lang="en-US" dirty="0" smtClean="0"/>
           </a:p>
         </p:txBody>
       </p:sp>
@@ -897,23 +1125,6 @@
           <a:bodyPr/>
           <a:lstStyle/>
           <a:p>
-            <a:pPr marL="0" marR="0" indent="0" algn="l" defTabSz="914400" rtl="0" eaLnBrk="1" fontAlgn="auto" latinLnBrk="0" hangingPunct="1">
-              <a:lnSpc>
-                <a:spcPct val="100000"/>
-              </a:lnSpc>
-              <a:spcBef>
-                <a:spcPts val="0"/>
-              </a:spcBef>
-              <a:spcAft>
-                <a:spcPts val="0"/>
-              </a:spcAft>
-              <a:buClrTx/>
-              <a:buSzTx/>
-              <a:buFontTx/>
-              <a:buNone/>
-              <a:tabLst/>
-              <a:defRPr/>
-            </a:pPr>
             <a:r>
               <a:rPr lang="en-US" sz="1200" b="0" i="0" u="none" strike="noStrike" kern="1200" baseline="0" dirty="0" smtClean="0">
                 <a:solidFill>
@@ -923,11 +1134,250 @@
                 <a:ea typeface="+mn-ea"/>
                 <a:cs typeface="+mn-cs"/>
               </a:rPr>
-              <a:t>A widget along the top or bottom is allocated a parcel just high enough to contain the widget, but occupying as much of the width of the container as possible, whereas widgets along the sides get a parcel of maximal height, but just wide enough to contain it.</a:t>
-            </a:r>
-            <a:endParaRPr lang="en-US" dirty="0" smtClean="0"/>
-          </a:p>
-          <a:p>
+              <a:t>The </a:t>
+            </a:r>
+            <a:r>
+              <a:rPr lang="en-US" sz="1200" b="0" i="0" u="none" strike="noStrike" kern="1200" baseline="0" dirty="0" err="1" smtClean="0">
+                <a:solidFill>
+                  <a:schemeClr val="tx1"/>
+                </a:solidFill>
+                <a:latin typeface="+mn-lt"/>
+                <a:ea typeface="+mn-ea"/>
+                <a:cs typeface="+mn-cs"/>
+              </a:rPr>
+              <a:t>tcltk</a:t>
+            </a:r>
+            <a:r>
+              <a:rPr lang="en-US" sz="1200" b="0" i="0" u="none" strike="noStrike" kern="1200" baseline="0" dirty="0" smtClean="0">
+                <a:solidFill>
+                  <a:schemeClr val="tx1"/>
+                </a:solidFill>
+                <a:latin typeface="+mn-lt"/>
+                <a:ea typeface="+mn-ea"/>
+                <a:cs typeface="+mn-cs"/>
+              </a:rPr>
+              <a:t> package creates objects with a few different classes, </a:t>
+            </a:r>
+            <a:r>
+              <a:rPr lang="en-US" sz="1200" b="0" i="0" u="none" strike="noStrike" kern="1200" baseline="0" dirty="0" err="1" smtClean="0">
+                <a:solidFill>
+                  <a:schemeClr val="tx1"/>
+                </a:solidFill>
+                <a:latin typeface="+mn-lt"/>
+                <a:ea typeface="+mn-ea"/>
+                <a:cs typeface="+mn-cs"/>
+              </a:rPr>
+              <a:t>tclObj</a:t>
+            </a:r>
+            <a:r>
+              <a:rPr lang="en-US" sz="1200" b="0" i="0" u="none" strike="noStrike" kern="1200" baseline="0" dirty="0" smtClean="0">
+                <a:solidFill>
+                  <a:schemeClr val="tx1"/>
+                </a:solidFill>
+                <a:latin typeface="+mn-lt"/>
+                <a:ea typeface="+mn-ea"/>
+                <a:cs typeface="+mn-cs"/>
+              </a:rPr>
+              <a:t> being the primary one (</a:t>
+            </a:r>
+            <a:r>
+              <a:rPr lang="en-US" sz="1200" b="0" i="0" u="none" strike="noStrike" kern="1200" baseline="0" dirty="0" err="1" smtClean="0">
+                <a:solidFill>
+                  <a:schemeClr val="tx1"/>
+                </a:solidFill>
+                <a:latin typeface="+mn-lt"/>
+                <a:ea typeface="+mn-ea"/>
+                <a:cs typeface="+mn-cs"/>
+              </a:rPr>
+              <a:t>tclVar</a:t>
+            </a:r>
+            <a:r>
+              <a:rPr lang="en-US" sz="1200" b="0" i="0" u="none" strike="noStrike" kern="1200" baseline="0" dirty="0" smtClean="0">
+                <a:solidFill>
+                  <a:schemeClr val="tx1"/>
+                </a:solidFill>
+                <a:latin typeface="+mn-lt"/>
+                <a:ea typeface="+mn-ea"/>
+                <a:cs typeface="+mn-cs"/>
+              </a:rPr>
+              <a:t> and </a:t>
+            </a:r>
+            <a:r>
+              <a:rPr lang="en-US" sz="1200" b="0" i="0" u="none" strike="noStrike" kern="1200" baseline="0" dirty="0" err="1" smtClean="0">
+                <a:solidFill>
+                  <a:schemeClr val="tx1"/>
+                </a:solidFill>
+                <a:latin typeface="+mn-lt"/>
+                <a:ea typeface="+mn-ea"/>
+                <a:cs typeface="+mn-cs"/>
+              </a:rPr>
+              <a:t>tkwin</a:t>
+            </a:r>
+            <a:r>
+              <a:rPr lang="en-US" sz="1200" b="0" i="0" u="none" strike="noStrike" kern="1200" baseline="0" dirty="0" smtClean="0">
+                <a:solidFill>
+                  <a:schemeClr val="tx1"/>
+                </a:solidFill>
+                <a:latin typeface="+mn-lt"/>
+                <a:ea typeface="+mn-ea"/>
+                <a:cs typeface="+mn-cs"/>
+              </a:rPr>
+              <a:t> are two other important ones). The </a:t>
+            </a:r>
+            <a:r>
+              <a:rPr lang="en-US" sz="1200" b="0" i="0" u="none" strike="noStrike" kern="1200" baseline="0" dirty="0" err="1" smtClean="0">
+                <a:solidFill>
+                  <a:schemeClr val="tx1"/>
+                </a:solidFill>
+                <a:latin typeface="+mn-lt"/>
+                <a:ea typeface="+mn-ea"/>
+                <a:cs typeface="+mn-cs"/>
+              </a:rPr>
+              <a:t>tclObj</a:t>
+            </a:r>
+            <a:r>
+              <a:rPr lang="en-US" sz="1200" b="0" i="0" u="none" strike="noStrike" kern="1200" baseline="0" dirty="0" smtClean="0">
+                <a:solidFill>
+                  <a:schemeClr val="tx1"/>
+                </a:solidFill>
+                <a:latin typeface="+mn-lt"/>
+                <a:ea typeface="+mn-ea"/>
+                <a:cs typeface="+mn-cs"/>
+              </a:rPr>
+              <a:t> objects print with the leading &lt;</a:t>
+            </a:r>
+            <a:r>
+              <a:rPr lang="en-US" sz="1200" b="0" i="0" u="none" strike="noStrike" kern="1200" baseline="0" dirty="0" err="1" smtClean="0">
+                <a:solidFill>
+                  <a:schemeClr val="tx1"/>
+                </a:solidFill>
+                <a:latin typeface="+mn-lt"/>
+                <a:ea typeface="+mn-ea"/>
+                <a:cs typeface="+mn-cs"/>
+              </a:rPr>
+              <a:t>Tcl</a:t>
+            </a:r>
+            <a:r>
+              <a:rPr lang="en-US" sz="1200" b="0" i="0" u="none" strike="noStrike" kern="1200" baseline="0" dirty="0" smtClean="0">
+                <a:solidFill>
+                  <a:schemeClr val="tx1"/>
+                </a:solidFill>
+                <a:latin typeface="+mn-lt"/>
+                <a:ea typeface="+mn-ea"/>
+                <a:cs typeface="+mn-cs"/>
+              </a:rPr>
+              <a:t>&gt;. The string representation of objects of class </a:t>
+            </a:r>
+            <a:r>
+              <a:rPr lang="en-US" sz="1200" b="0" i="0" u="none" strike="noStrike" kern="1200" baseline="0" dirty="0" err="1" smtClean="0">
+                <a:solidFill>
+                  <a:schemeClr val="tx1"/>
+                </a:solidFill>
+                <a:latin typeface="+mn-lt"/>
+                <a:ea typeface="+mn-ea"/>
+                <a:cs typeface="+mn-cs"/>
+              </a:rPr>
+              <a:t>tclObj</a:t>
+            </a:r>
+            <a:r>
+              <a:rPr lang="en-US" sz="1200" b="0" i="0" u="none" strike="noStrike" kern="1200" baseline="0" dirty="0" smtClean="0">
+                <a:solidFill>
+                  <a:schemeClr val="tx1"/>
+                </a:solidFill>
+                <a:latin typeface="+mn-lt"/>
+                <a:ea typeface="+mn-ea"/>
+                <a:cs typeface="+mn-cs"/>
+              </a:rPr>
+              <a:t> is returned by </a:t>
+            </a:r>
+            <a:r>
+              <a:rPr lang="en-US" sz="1200" b="0" i="0" u="none" strike="noStrike" kern="1200" baseline="0" dirty="0" err="1" smtClean="0">
+                <a:solidFill>
+                  <a:schemeClr val="tx1"/>
+                </a:solidFill>
+                <a:latin typeface="+mn-lt"/>
+                <a:ea typeface="+mn-ea"/>
+                <a:cs typeface="+mn-cs"/>
+              </a:rPr>
+              <a:t>tclvalue</a:t>
+            </a:r>
+            <a:r>
+              <a:rPr lang="en-US" sz="1200" b="0" i="0" u="none" strike="noStrike" kern="1200" baseline="0" dirty="0" smtClean="0">
+                <a:solidFill>
+                  <a:schemeClr val="tx1"/>
+                </a:solidFill>
+                <a:latin typeface="+mn-lt"/>
+                <a:ea typeface="+mn-ea"/>
+                <a:cs typeface="+mn-cs"/>
+              </a:rPr>
+              <a:t> or by coercion through the </a:t>
+            </a:r>
+            <a:r>
+              <a:rPr lang="en-US" sz="1200" b="0" i="0" u="none" strike="noStrike" kern="1200" baseline="0" dirty="0" err="1" smtClean="0">
+                <a:solidFill>
+                  <a:schemeClr val="tx1"/>
+                </a:solidFill>
+                <a:latin typeface="+mn-lt"/>
+                <a:ea typeface="+mn-ea"/>
+                <a:cs typeface="+mn-cs"/>
+              </a:rPr>
+              <a:t>as.character</a:t>
+            </a:r>
+            <a:r>
+              <a:rPr lang="en-US" sz="1200" b="0" i="0" u="none" strike="noStrike" kern="1200" baseline="0" dirty="0" smtClean="0">
+                <a:solidFill>
+                  <a:schemeClr val="tx1"/>
+                </a:solidFill>
+                <a:latin typeface="+mn-lt"/>
+                <a:ea typeface="+mn-ea"/>
+                <a:cs typeface="+mn-cs"/>
+              </a:rPr>
+              <a:t> function. These two differ in how they treat spaces and new lines. Conversion to vectors of mode character, double, integer, and logical is possible, though, in general, direct conversion of complicated </a:t>
+            </a:r>
+            <a:r>
+              <a:rPr lang="en-US" sz="1200" b="0" i="0" u="none" strike="noStrike" kern="1200" baseline="0" dirty="0" err="1" smtClean="0">
+                <a:solidFill>
+                  <a:schemeClr val="tx1"/>
+                </a:solidFill>
+                <a:latin typeface="+mn-lt"/>
+                <a:ea typeface="+mn-ea"/>
+                <a:cs typeface="+mn-cs"/>
+              </a:rPr>
+              <a:t>Tcl</a:t>
+            </a:r>
+            <a:r>
+              <a:rPr lang="en-US" sz="1200" b="0" i="0" u="none" strike="noStrike" kern="1200" baseline="0" dirty="0" smtClean="0">
+                <a:solidFill>
+                  <a:schemeClr val="tx1"/>
+                </a:solidFill>
+                <a:latin typeface="+mn-lt"/>
+                <a:ea typeface="+mn-ea"/>
+                <a:cs typeface="+mn-cs"/>
+              </a:rPr>
+              <a:t> expressions is not supported. We can create objects of this class through </a:t>
+            </a:r>
+            <a:r>
+              <a:rPr lang="en-US" sz="1200" b="0" i="0" u="none" strike="noStrike" kern="1200" baseline="0" dirty="0" err="1" smtClean="0">
+                <a:solidFill>
+                  <a:schemeClr val="tx1"/>
+                </a:solidFill>
+                <a:latin typeface="+mn-lt"/>
+                <a:ea typeface="+mn-ea"/>
+                <a:cs typeface="+mn-cs"/>
+              </a:rPr>
+              <a:t>as.tclObj</a:t>
+            </a:r>
+            <a:r>
+              <a:rPr lang="en-US" sz="1200" b="0" i="0" u="none" strike="noStrike" kern="1200" baseline="0" dirty="0" smtClean="0">
+                <a:solidFill>
+                  <a:schemeClr val="tx1"/>
+                </a:solidFill>
+                <a:latin typeface="+mn-lt"/>
+                <a:ea typeface="+mn-ea"/>
+                <a:cs typeface="+mn-cs"/>
+              </a:rPr>
+              <a:t>.</a:t>
+            </a:r>
             <a:endParaRPr lang="en-US" dirty="0"/>
           </a:p>
         </p:txBody>
@@ -958,7 +1408,7 @@
     </p:spTree>
     <p:extLst>
       <p:ext uri="{BB962C8B-B14F-4D97-AF65-F5344CB8AC3E}">
-        <p14:creationId xmlns:p14="http://schemas.microsoft.com/office/powerpoint/2010/main" val="3324389834"/>
+        <p14:creationId xmlns:p14="http://schemas.microsoft.com/office/powerpoint/2010/main" val="3340012078"/>
       </p:ext>
     </p:extLst>
   </p:cSld>
@@ -1012,6 +1462,54 @@
           <a:bodyPr/>
           <a:lstStyle/>
           <a:p>
+            <a:r>
+              <a:rPr lang="en-US" sz="1200" b="0" i="0" u="none" strike="noStrike" kern="1200" baseline="0" dirty="0" smtClean="0">
+                <a:solidFill>
+                  <a:schemeClr val="tx1"/>
+                </a:solidFill>
+                <a:latin typeface="+mn-lt"/>
+                <a:ea typeface="+mn-ea"/>
+                <a:cs typeface="+mn-cs"/>
+              </a:rPr>
+              <a:t>Tk widgets are constructed as children of a parent object, with the parent specified to the constructor. It means other widget constructors require that a parent widget be specified as the first argument of the constructor. </a:t>
+            </a:r>
+          </a:p>
+          <a:p>
+            <a:endParaRPr lang="en-US" sz="1200" b="0" i="0" u="none" strike="noStrike" kern="1200" baseline="0" dirty="0" smtClean="0">
+              <a:solidFill>
+                <a:schemeClr val="tx1"/>
+              </a:solidFill>
+              <a:latin typeface="+mn-lt"/>
+              <a:ea typeface="+mn-ea"/>
+              <a:cs typeface="+mn-cs"/>
+            </a:endParaRPr>
+          </a:p>
+          <a:p>
+            <a:r>
+              <a:rPr lang="en-US" sz="1200" b="0" i="0" u="none" strike="noStrike" kern="1200" baseline="0" dirty="0" smtClean="0">
+                <a:solidFill>
+                  <a:schemeClr val="tx1"/>
+                </a:solidFill>
+                <a:latin typeface="+mn-lt"/>
+                <a:ea typeface="+mn-ea"/>
+                <a:cs typeface="+mn-cs"/>
+              </a:rPr>
+              <a:t>A </a:t>
+            </a:r>
+            <a:r>
+              <a:rPr lang="en-US" sz="1200" b="0" i="0" u="none" strike="noStrike" kern="1200" baseline="0" dirty="0" smtClean="0">
+                <a:solidFill>
+                  <a:schemeClr val="tx1"/>
+                </a:solidFill>
+                <a:latin typeface="+mn-lt"/>
+                <a:ea typeface="+mn-ea"/>
+                <a:cs typeface="+mn-cs"/>
+              </a:rPr>
+              <a:t>widget along the top or bottom is allocated a parcel just high enough to contain the widget, but occupying as much of the width of the container as possible, whereas widgets along the sides get a parcel of maximal height, but just wide enough to contain it.</a:t>
+            </a:r>
+            <a:endParaRPr lang="en-US" dirty="0" smtClean="0"/>
+          </a:p>
+          <a:p>
             <a:endParaRPr lang="en-US" dirty="0"/>
           </a:p>
         </p:txBody>
@@ -1034,6 +1532,259 @@
             <a:fld id="{5BE9B818-C9FD-4006-B50B-90DC08C31B92}" type="slidenum">
               <a:rPr lang="en-US" smtClean="0"/>
               <a:t>5</a:t>
+            </a:fld>
+            <a:endParaRPr lang="en-US"/>
+          </a:p>
+        </p:txBody>
+      </p:sp>
+    </p:spTree>
+    <p:extLst>
+      <p:ext uri="{BB962C8B-B14F-4D97-AF65-F5344CB8AC3E}">
+        <p14:creationId xmlns:p14="http://schemas.microsoft.com/office/powerpoint/2010/main" val="3324389834"/>
+      </p:ext>
+    </p:extLst>
+  </p:cSld>
+  <p:clrMapOvr>
+    <a:masterClrMapping/>
+  </p:clrMapOvr>
+</p:notes>
+</file>
+
+<file path=ppt/notesSlides/notesSlide5.xml><?xml version="1.0" encoding="utf-8"?>
+<p:notes xmlns:a="http://schemas.openxmlformats.org/drawingml/2006/main" xmlns:r="http://schemas.openxmlformats.org/officeDocument/2006/relationships" xmlns:p="http://schemas.openxmlformats.org/presentationml/2006/main">
+  <p:cSld>
+    <p:spTree>
+      <p:nvGrpSpPr>
+        <p:cNvPr id="1" name=""/>
+        <p:cNvGrpSpPr/>
+        <p:nvPr/>
+      </p:nvGrpSpPr>
+      <p:grpSpPr>
+        <a:xfrm>
+          <a:off x="0" y="0"/>
+          <a:ext cx="0" cy="0"/>
+          <a:chOff x="0" y="0"/>
+          <a:chExt cx="0" cy="0"/>
+        </a:xfrm>
+      </p:grpSpPr>
+      <p:sp>
+        <p:nvSpPr>
+          <p:cNvPr id="2" name="Slide Image Placeholder 1"/>
+          <p:cNvSpPr>
+            <a:spLocks noGrp="1" noRot="1" noChangeAspect="1"/>
+          </p:cNvSpPr>
+          <p:nvPr>
+            <p:ph type="sldImg"/>
+          </p:nvPr>
+        </p:nvSpPr>
+        <p:spPr/>
+      </p:sp>
+      <p:sp>
+        <p:nvSpPr>
+          <p:cNvPr id="3" name="Notes Placeholder 2"/>
+          <p:cNvSpPr>
+            <a:spLocks noGrp="1"/>
+          </p:cNvSpPr>
+          <p:nvPr>
+            <p:ph type="body" idx="1"/>
+          </p:nvPr>
+        </p:nvSpPr>
+        <p:spPr/>
+        <p:txBody>
+          <a:bodyPr/>
+          <a:lstStyle/>
+          <a:p>
+            <a:r>
+              <a:rPr lang="en-US" sz="1200" b="0" i="0" u="none" strike="noStrike" kern="1200" baseline="0" dirty="0" smtClean="0">
+                <a:solidFill>
+                  <a:schemeClr val="tx1"/>
+                </a:solidFill>
+                <a:latin typeface="+mn-lt"/>
+                <a:ea typeface="+mn-ea"/>
+                <a:cs typeface="+mn-cs"/>
+              </a:rPr>
+              <a:t>simple label, the following options are possible: anchor, background, font, foreground, justify, padding, relief, text, and </a:t>
+            </a:r>
+            <a:r>
+              <a:rPr lang="en-US" sz="1200" b="0" i="0" u="none" strike="noStrike" kern="1200" baseline="0" dirty="0" err="1" smtClean="0">
+                <a:solidFill>
+                  <a:schemeClr val="tx1"/>
+                </a:solidFill>
+                <a:latin typeface="+mn-lt"/>
+                <a:ea typeface="+mn-ea"/>
+                <a:cs typeface="+mn-cs"/>
+              </a:rPr>
+              <a:t>wraplength</a:t>
+            </a:r>
+            <a:r>
+              <a:rPr lang="en-US" sz="1200" b="0" i="0" u="none" strike="noStrike" kern="1200" baseline="0" dirty="0" smtClean="0">
+                <a:solidFill>
+                  <a:schemeClr val="tx1"/>
+                </a:solidFill>
+                <a:latin typeface="+mn-lt"/>
+                <a:ea typeface="+mn-ea"/>
+                <a:cs typeface="+mn-cs"/>
+              </a:rPr>
+              <a:t>. The main</a:t>
+            </a:r>
+          </a:p>
+          <a:p>
+            <a:r>
+              <a:rPr lang="en-US" sz="1200" b="0" i="0" u="none" strike="noStrike" kern="1200" baseline="0" dirty="0" smtClean="0">
+                <a:solidFill>
+                  <a:schemeClr val="tx1"/>
+                </a:solidFill>
+                <a:latin typeface="+mn-lt"/>
+                <a:ea typeface="+mn-ea"/>
+                <a:cs typeface="+mn-cs"/>
+              </a:rPr>
+              <a:t>option, text, takes a character string. The label will be multiline if it contains new line characters. The padding argument allows the specification</a:t>
+            </a:r>
+          </a:p>
+          <a:p>
+            <a:r>
+              <a:rPr lang="en-US" sz="1200" b="0" i="0" u="none" strike="noStrike" kern="1200" baseline="0" dirty="0" smtClean="0">
+                <a:solidFill>
+                  <a:schemeClr val="tx1"/>
+                </a:solidFill>
+                <a:latin typeface="+mn-lt"/>
+                <a:ea typeface="+mn-ea"/>
+                <a:cs typeface="+mn-cs"/>
+              </a:rPr>
+              <a:t>of space in pixels between the text of the label and the widget boundary. This may be set as four values (left, top, right, bottom), or fewer,</a:t>
+            </a:r>
+          </a:p>
+          <a:p>
+            <a:r>
+              <a:rPr lang="en-US" sz="1200" b="0" i="0" u="none" strike="noStrike" kern="1200" baseline="0" dirty="0" smtClean="0">
+                <a:solidFill>
+                  <a:schemeClr val="tx1"/>
+                </a:solidFill>
+                <a:latin typeface="+mn-lt"/>
+                <a:ea typeface="+mn-ea"/>
+                <a:cs typeface="+mn-cs"/>
+              </a:rPr>
+              <a:t>with bottom defaulting to top, right to left, and top to left. The relief argument specifies how a 3-D effect around the label should look, if specified.</a:t>
+            </a:r>
+          </a:p>
+          <a:p>
+            <a:r>
+              <a:rPr lang="en-US" sz="1200" b="0" i="0" u="none" strike="noStrike" kern="1200" baseline="0" dirty="0" smtClean="0">
+                <a:solidFill>
+                  <a:schemeClr val="tx1"/>
+                </a:solidFill>
+                <a:latin typeface="+mn-lt"/>
+                <a:ea typeface="+mn-ea"/>
+                <a:cs typeface="+mn-cs"/>
+              </a:rPr>
+              <a:t>Possible values are "flat", "groove", "raised", "ridge", "solid", and "sunken".</a:t>
+            </a:r>
+            <a:endParaRPr lang="en-US" dirty="0"/>
+          </a:p>
+        </p:txBody>
+      </p:sp>
+      <p:sp>
+        <p:nvSpPr>
+          <p:cNvPr id="4" name="Slide Number Placeholder 3"/>
+          <p:cNvSpPr>
+            <a:spLocks noGrp="1"/>
+          </p:cNvSpPr>
+          <p:nvPr>
+            <p:ph type="sldNum" sz="quarter" idx="10"/>
+          </p:nvPr>
+        </p:nvSpPr>
+        <p:spPr/>
+        <p:txBody>
+          <a:bodyPr/>
+          <a:lstStyle/>
+          <a:p>
+            <a:fld id="{5BE9B818-C9FD-4006-B50B-90DC08C31B92}" type="slidenum">
+              <a:rPr lang="en-US" smtClean="0"/>
+              <a:t>6</a:t>
+            </a:fld>
+            <a:endParaRPr lang="en-US"/>
+          </a:p>
+        </p:txBody>
+      </p:sp>
+    </p:spTree>
+    <p:extLst>
+      <p:ext uri="{BB962C8B-B14F-4D97-AF65-F5344CB8AC3E}">
+        <p14:creationId xmlns:p14="http://schemas.microsoft.com/office/powerpoint/2010/main" val="1506715935"/>
+      </p:ext>
+    </p:extLst>
+  </p:cSld>
+  <p:clrMapOvr>
+    <a:masterClrMapping/>
+  </p:clrMapOvr>
+</p:notes>
+</file>
+
+<file path=ppt/notesSlides/notesSlide6.xml><?xml version="1.0" encoding="utf-8"?>
+<p:notes xmlns:a="http://schemas.openxmlformats.org/drawingml/2006/main" xmlns:r="http://schemas.openxmlformats.org/officeDocument/2006/relationships" xmlns:p="http://schemas.openxmlformats.org/presentationml/2006/main">
+  <p:cSld>
+    <p:spTree>
+      <p:nvGrpSpPr>
+        <p:cNvPr id="1" name=""/>
+        <p:cNvGrpSpPr/>
+        <p:nvPr/>
+      </p:nvGrpSpPr>
+      <p:grpSpPr>
+        <a:xfrm>
+          <a:off x="0" y="0"/>
+          <a:ext cx="0" cy="0"/>
+          <a:chOff x="0" y="0"/>
+          <a:chExt cx="0" cy="0"/>
+        </a:xfrm>
+      </p:grpSpPr>
+      <p:sp>
+        <p:nvSpPr>
+          <p:cNvPr id="2" name="Slide Image Placeholder 1"/>
+          <p:cNvSpPr>
+            <a:spLocks noGrp="1" noRot="1" noChangeAspect="1"/>
+          </p:cNvSpPr>
+          <p:nvPr>
+            <p:ph type="sldImg"/>
+          </p:nvPr>
+        </p:nvSpPr>
+        <p:spPr/>
+      </p:sp>
+      <p:sp>
+        <p:nvSpPr>
+          <p:cNvPr id="3" name="Notes Placeholder 2"/>
+          <p:cNvSpPr>
+            <a:spLocks noGrp="1"/>
+          </p:cNvSpPr>
+          <p:nvPr>
+            <p:ph type="body" idx="1"/>
+          </p:nvPr>
+        </p:nvSpPr>
+        <p:spPr/>
+        <p:txBody>
+          <a:bodyPr/>
+          <a:lstStyle/>
+          <a:p>
+            <a:endParaRPr lang="en-US" dirty="0"/>
+          </a:p>
+        </p:txBody>
+      </p:sp>
+      <p:sp>
+        <p:nvSpPr>
+          <p:cNvPr id="4" name="Slide Number Placeholder 3"/>
+          <p:cNvSpPr>
+            <a:spLocks noGrp="1"/>
+          </p:cNvSpPr>
+          <p:nvPr>
+            <p:ph type="sldNum" sz="quarter" idx="10"/>
+          </p:nvPr>
+        </p:nvSpPr>
+        <p:spPr/>
+        <p:txBody>
+          <a:bodyPr/>
+          <a:lstStyle/>
+          <a:p>
+            <a:fld id="{5BE9B818-C9FD-4006-B50B-90DC08C31B92}" type="slidenum">
+              <a:rPr lang="en-US" smtClean="0"/>
+              <a:t>7</a:t>
             </a:fld>
             <a:endParaRPr lang="en-US"/>
           </a:p>
@@ -1234,7 +1985,7 @@
             <a:fld id="{1D8BD707-D9CF-40AE-B4C6-C98DA3205C09}" type="datetimeFigureOut">
               <a:rPr lang="en-US" smtClean="0"/>
               <a:pPr/>
-              <a:t>10/14/2014</a:t>
+              <a:t>10/16/2014</a:t>
             </a:fld>
             <a:endParaRPr lang="en-US"/>
           </a:p>
@@ -1401,7 +2152,7 @@
             <a:fld id="{1D8BD707-D9CF-40AE-B4C6-C98DA3205C09}" type="datetimeFigureOut">
               <a:rPr lang="en-US" smtClean="0"/>
               <a:pPr/>
-              <a:t>10/14/2014</a:t>
+              <a:t>10/16/2014</a:t>
             </a:fld>
             <a:endParaRPr lang="en-US"/>
           </a:p>
@@ -1578,7 +2329,7 @@
             <a:fld id="{1D8BD707-D9CF-40AE-B4C6-C98DA3205C09}" type="datetimeFigureOut">
               <a:rPr lang="en-US" smtClean="0"/>
               <a:pPr/>
-              <a:t>10/14/2014</a:t>
+              <a:t>10/16/2014</a:t>
             </a:fld>
             <a:endParaRPr lang="en-US"/>
           </a:p>
@@ -1745,7 +2496,7 @@
             <a:fld id="{1D8BD707-D9CF-40AE-B4C6-C98DA3205C09}" type="datetimeFigureOut">
               <a:rPr lang="en-US" smtClean="0"/>
               <a:pPr/>
-              <a:t>10/14/2014</a:t>
+              <a:t>10/16/2014</a:t>
             </a:fld>
             <a:endParaRPr lang="en-US"/>
           </a:p>
@@ -1988,7 +2739,7 @@
             <a:fld id="{1D8BD707-D9CF-40AE-B4C6-C98DA3205C09}" type="datetimeFigureOut">
               <a:rPr lang="en-US" smtClean="0"/>
               <a:pPr/>
-              <a:t>10/14/2014</a:t>
+              <a:t>10/16/2014</a:t>
             </a:fld>
             <a:endParaRPr lang="en-US"/>
           </a:p>
@@ -2273,7 +3024,7 @@
             <a:fld id="{1D8BD707-D9CF-40AE-B4C6-C98DA3205C09}" type="datetimeFigureOut">
               <a:rPr lang="en-US" smtClean="0"/>
               <a:pPr/>
-              <a:t>10/14/2014</a:t>
+              <a:t>10/16/2014</a:t>
             </a:fld>
             <a:endParaRPr lang="en-US"/>
           </a:p>
@@ -2692,7 +3443,7 @@
             <a:fld id="{1D8BD707-D9CF-40AE-B4C6-C98DA3205C09}" type="datetimeFigureOut">
               <a:rPr lang="en-US" smtClean="0"/>
               <a:pPr/>
-              <a:t>10/14/2014</a:t>
+              <a:t>10/16/2014</a:t>
             </a:fld>
             <a:endParaRPr lang="en-US"/>
           </a:p>
@@ -2807,7 +3558,7 @@
             <a:fld id="{1D8BD707-D9CF-40AE-B4C6-C98DA3205C09}" type="datetimeFigureOut">
               <a:rPr lang="en-US" smtClean="0"/>
               <a:pPr/>
-              <a:t>10/14/2014</a:t>
+              <a:t>10/16/2014</a:t>
             </a:fld>
             <a:endParaRPr lang="en-US"/>
           </a:p>
@@ -2899,7 +3650,7 @@
             <a:fld id="{1D8BD707-D9CF-40AE-B4C6-C98DA3205C09}" type="datetimeFigureOut">
               <a:rPr lang="en-US" smtClean="0"/>
               <a:pPr/>
-              <a:t>10/14/2014</a:t>
+              <a:t>10/16/2014</a:t>
             </a:fld>
             <a:endParaRPr lang="en-US"/>
           </a:p>
@@ -3173,7 +3924,7 @@
             <a:fld id="{1D8BD707-D9CF-40AE-B4C6-C98DA3205C09}" type="datetimeFigureOut">
               <a:rPr lang="en-US" smtClean="0"/>
               <a:pPr/>
-              <a:t>10/14/2014</a:t>
+              <a:t>10/16/2014</a:t>
             </a:fld>
             <a:endParaRPr lang="en-US"/>
           </a:p>
@@ -3423,7 +4174,7 @@
             <a:fld id="{1D8BD707-D9CF-40AE-B4C6-C98DA3205C09}" type="datetimeFigureOut">
               <a:rPr lang="en-US" smtClean="0"/>
               <a:pPr/>
-              <a:t>10/14/2014</a:t>
+              <a:t>10/16/2014</a:t>
             </a:fld>
             <a:endParaRPr lang="en-US"/>
           </a:p>
@@ -3633,7 +4384,7 @@
             <a:fld id="{1D8BD707-D9CF-40AE-B4C6-C98DA3205C09}" type="datetimeFigureOut">
               <a:rPr lang="en-US" smtClean="0"/>
               <a:pPr/>
-              <a:t>10/14/2014</a:t>
+              <a:t>10/16/2014</a:t>
             </a:fld>
             <a:endParaRPr lang="en-US"/>
           </a:p>
@@ -4310,7 +5061,12 @@
             <p:ph idx="1"/>
           </p:nvPr>
         </p:nvSpPr>
-        <p:spPr/>
+        <p:spPr>
+          <a:xfrm>
+            <a:off x="457200" y="1295400"/>
+            <a:ext cx="8229600" cy="4297363"/>
+          </a:xfrm>
+        </p:spPr>
         <p:txBody>
           <a:bodyPr>
             <a:normAutofit/>
@@ -4468,142 +5224,14 @@
       </p:grpSpPr>
       <p:sp>
         <p:nvSpPr>
-          <p:cNvPr id="2" name="Title 1"/>
-          <p:cNvSpPr>
-            <a:spLocks noGrp="1"/>
-          </p:cNvSpPr>
-          <p:nvPr>
-            <p:ph type="title"/>
-          </p:nvPr>
-        </p:nvSpPr>
-        <p:spPr/>
-        <p:txBody>
-          <a:bodyPr>
-            <a:normAutofit fontScale="90000"/>
-          </a:bodyPr>
-          <a:lstStyle/>
-          <a:p>
-            <a:r>
-              <a:rPr lang="en-US" b="1" dirty="0"/>
-              <a:t>Widgets</a:t>
-            </a:r>
-            <a:br>
-              <a:rPr lang="en-US" b="1" dirty="0"/>
-            </a:br>
-            <a:endParaRPr lang="en-US" dirty="0"/>
-          </a:p>
-        </p:txBody>
-      </p:sp>
-      <p:sp>
-        <p:nvSpPr>
-          <p:cNvPr id="3" name="Content Placeholder 2"/>
-          <p:cNvSpPr>
-            <a:spLocks noGrp="1"/>
-          </p:cNvSpPr>
-          <p:nvPr>
-            <p:ph idx="1"/>
-          </p:nvPr>
+          <p:cNvPr id="2" name="TextBox 1"/>
+          <p:cNvSpPr txBox="1"/>
+          <p:nvPr/>
         </p:nvSpPr>
         <p:spPr>
           <a:xfrm>
-            <a:off x="457200" y="1219200"/>
-            <a:ext cx="8229600" cy="4906963"/>
-          </a:xfrm>
-        </p:spPr>
-        <p:txBody>
-          <a:bodyPr>
-            <a:normAutofit/>
-          </a:bodyPr>
-          <a:lstStyle/>
-          <a:p>
-            <a:pPr marL="0" indent="0">
-              <a:buNone/>
-            </a:pPr>
-            <a:r>
-              <a:rPr lang="en-US" dirty="0" smtClean="0"/>
-              <a:t>A </a:t>
-            </a:r>
-            <a:r>
-              <a:rPr lang="en-US" dirty="0"/>
-              <a:t>widget is a GUI </a:t>
-            </a:r>
-            <a:r>
-              <a:rPr lang="en-US" dirty="0" smtClean="0"/>
-              <a:t>element, like </a:t>
-            </a:r>
-            <a:r>
-              <a:rPr lang="en-US" dirty="0"/>
-              <a:t>buttons, scrollbars, text areas etc.</a:t>
-            </a:r>
-            <a:endParaRPr lang="en-US" dirty="0" smtClean="0"/>
-          </a:p>
-          <a:p>
-            <a:pPr marL="0" indent="0">
-              <a:buNone/>
-            </a:pPr>
-            <a:r>
-              <a:rPr lang="en-US" dirty="0" smtClean="0"/>
-              <a:t>Tk </a:t>
-            </a:r>
-            <a:r>
-              <a:rPr lang="en-US" dirty="0"/>
-              <a:t>comes with a </a:t>
-            </a:r>
-            <a:r>
-              <a:rPr lang="en-US" dirty="0" smtClean="0"/>
-              <a:t>selection of </a:t>
-            </a:r>
-            <a:r>
-              <a:rPr lang="en-US" dirty="0"/>
-              <a:t>basic widgets: </a:t>
-            </a:r>
-            <a:endParaRPr lang="en-US" dirty="0" smtClean="0"/>
-          </a:p>
-          <a:p>
-            <a:pPr marL="0" indent="0">
-              <a:buNone/>
-            </a:pPr>
-            <a:endParaRPr lang="en-US" dirty="0" smtClean="0"/>
-          </a:p>
-          <a:p>
-            <a:pPr marL="0" indent="0">
-              <a:buNone/>
-            </a:pPr>
-            <a:endParaRPr lang="en-US" dirty="0"/>
-          </a:p>
-          <a:p>
-            <a:pPr marL="0" indent="0">
-              <a:buNone/>
-            </a:pPr>
-            <a:r>
-              <a:rPr lang="en-US" dirty="0" smtClean="0"/>
-              <a:t>These </a:t>
-            </a:r>
-            <a:r>
-              <a:rPr lang="en-US" dirty="0"/>
-              <a:t>can be </a:t>
-            </a:r>
-            <a:r>
-              <a:rPr lang="en-US" dirty="0" smtClean="0"/>
-              <a:t>combined to </a:t>
-            </a:r>
-            <a:r>
-              <a:rPr lang="en-US" dirty="0"/>
-              <a:t>form more complex GUI applications.</a:t>
-            </a:r>
-          </a:p>
-        </p:txBody>
-      </p:sp>
-      <p:sp>
-        <p:nvSpPr>
-          <p:cNvPr id="4" name="TextBox 3"/>
-          <p:cNvSpPr txBox="1"/>
-          <p:nvPr/>
-        </p:nvSpPr>
-        <p:spPr>
-          <a:xfrm>
-            <a:off x="512618" y="2743200"/>
-            <a:ext cx="7924800" cy="2585323"/>
+            <a:off x="762000" y="838200"/>
+            <a:ext cx="7620000" cy="923330"/>
           </a:xfrm>
           <a:prstGeom prst="rect">
             <a:avLst/>
@@ -4611,137 +5239,38 @@
           <a:noFill/>
         </p:spPr>
         <p:txBody>
-          <a:bodyPr wrap="square" numCol="2" rtlCol="0">
+          <a:bodyPr wrap="square" rtlCol="0">
             <a:spAutoFit/>
           </a:bodyPr>
           <a:lstStyle/>
           <a:p>
-            <a:pPr marL="285750" indent="-285750">
-              <a:buFont typeface="Arial" panose="020B0604020202020204" pitchFamily="34" charset="0"/>
-              <a:buChar char="•"/>
-            </a:pPr>
-            <a:r>
-              <a:rPr lang="en-US" sz="2000" dirty="0"/>
-              <a:t>text editing windows</a:t>
-            </a:r>
-          </a:p>
-          <a:p>
-            <a:pPr marL="285750" indent="-285750">
-              <a:buFont typeface="Arial" panose="020B0604020202020204" pitchFamily="34" charset="0"/>
-              <a:buChar char="•"/>
-            </a:pPr>
-            <a:r>
-              <a:rPr lang="en-US" sz="2000" dirty="0"/>
-              <a:t>Sliders</a:t>
-            </a:r>
-          </a:p>
-          <a:p>
-            <a:pPr marL="285750" indent="-285750">
-              <a:buFont typeface="Arial" panose="020B0604020202020204" pitchFamily="34" charset="0"/>
-              <a:buChar char="•"/>
-            </a:pPr>
-            <a:r>
-              <a:rPr lang="en-US" sz="2000" dirty="0"/>
-              <a:t>text entry </a:t>
-            </a:r>
-            <a:r>
-              <a:rPr lang="en-US" sz="2000" dirty="0" smtClean="0"/>
-              <a:t>fields</a:t>
-            </a:r>
-          </a:p>
-          <a:p>
-            <a:pPr marL="285750" indent="-285750">
-              <a:buFont typeface="Arial" panose="020B0604020202020204" pitchFamily="34" charset="0"/>
-              <a:buChar char="•"/>
-            </a:pPr>
-            <a:r>
-              <a:rPr lang="en-US" sz="2000" dirty="0" smtClean="0"/>
-              <a:t>Buttons</a:t>
-            </a:r>
-          </a:p>
-          <a:p>
-            <a:pPr marL="285750" indent="-285750">
-              <a:buFont typeface="Arial" panose="020B0604020202020204" pitchFamily="34" charset="0"/>
-              <a:buChar char="•"/>
-            </a:pPr>
-            <a:endParaRPr lang="en-US" sz="2000" dirty="0"/>
-          </a:p>
-          <a:p>
-            <a:pPr marL="285750" indent="-285750">
-              <a:buFont typeface="Arial" panose="020B0604020202020204" pitchFamily="34" charset="0"/>
-              <a:buChar char="•"/>
-            </a:pPr>
-            <a:endParaRPr lang="en-US" sz="2000" dirty="0" smtClean="0"/>
-          </a:p>
-          <a:p>
-            <a:pPr marL="285750" indent="-285750">
-              <a:buFont typeface="Arial" panose="020B0604020202020204" pitchFamily="34" charset="0"/>
-              <a:buChar char="•"/>
-            </a:pPr>
-            <a:endParaRPr lang="en-US" sz="2000" dirty="0"/>
-          </a:p>
-          <a:p>
-            <a:endParaRPr lang="en-US" sz="2000" dirty="0" smtClean="0"/>
-          </a:p>
-          <a:p>
-            <a:pPr marL="285750" indent="-285750">
-              <a:buFont typeface="Arial" panose="020B0604020202020204" pitchFamily="34" charset="0"/>
-              <a:buChar char="•"/>
-            </a:pPr>
-            <a:r>
-              <a:rPr lang="en-US" sz="2000" dirty="0" smtClean="0"/>
-              <a:t>Labels</a:t>
-            </a:r>
-            <a:endParaRPr lang="en-US" sz="2000" dirty="0"/>
-          </a:p>
-          <a:p>
-            <a:pPr marL="285750" indent="-285750">
-              <a:buFont typeface="Arial" panose="020B0604020202020204" pitchFamily="34" charset="0"/>
-              <a:buChar char="•"/>
-            </a:pPr>
-            <a:r>
-              <a:rPr lang="en-US" sz="2000" dirty="0"/>
-              <a:t>Menus</a:t>
-            </a:r>
-          </a:p>
-          <a:p>
-            <a:pPr marL="285750" indent="-285750">
-              <a:buFont typeface="Arial" panose="020B0604020202020204" pitchFamily="34" charset="0"/>
-              <a:buChar char="•"/>
-            </a:pPr>
-            <a:r>
-              <a:rPr lang="en-US" sz="2000" dirty="0"/>
-              <a:t>list boxes</a:t>
-            </a:r>
-          </a:p>
-          <a:p>
-            <a:pPr marL="285750" indent="-285750">
-              <a:buFont typeface="Arial" panose="020B0604020202020204" pitchFamily="34" charset="0"/>
-              <a:buChar char="•"/>
-            </a:pPr>
-            <a:r>
-              <a:rPr lang="en-US" sz="2000" dirty="0"/>
-              <a:t>canvas for drawing </a:t>
-            </a:r>
-            <a:r>
-              <a:rPr lang="en-US" sz="2000" dirty="0" smtClean="0"/>
-              <a:t>graphics </a:t>
-            </a:r>
-            <a:endParaRPr lang="en-US" sz="2000" dirty="0"/>
-          </a:p>
-          <a:p>
-            <a:pPr marL="285750" indent="-285750">
-              <a:buFont typeface="Arial" panose="020B0604020202020204" pitchFamily="34" charset="0"/>
-              <a:buChar char="•"/>
-            </a:pPr>
-            <a:endParaRPr lang="en-US" sz="2000" dirty="0"/>
+            <a:r>
+              <a:rPr lang="en-US" dirty="0"/>
+              <a:t>The most usual case for building a R GUI using **</a:t>
+            </a:r>
+            <a:r>
+              <a:rPr lang="en-US" dirty="0" err="1"/>
+              <a:t>tcltk</a:t>
+            </a:r>
+            <a:r>
+              <a:rPr lang="en-US" dirty="0"/>
+              <a:t>** is to defines a top-level window </a:t>
+            </a:r>
+            <a:r>
+              <a:rPr lang="en-US" dirty="0" smtClean="0"/>
+              <a:t>first </a:t>
+            </a:r>
+            <a:r>
+              <a:rPr lang="en-US" dirty="0"/>
+              <a:t>and the second an underlying frame container. We then define and place the widgets.</a:t>
+            </a:r>
           </a:p>
         </p:txBody>
       </p:sp>
     </p:spTree>
     <p:extLst>
       <p:ext uri="{BB962C8B-B14F-4D97-AF65-F5344CB8AC3E}">
-        <p14:creationId xmlns:p14="http://schemas.microsoft.com/office/powerpoint/2010/main" val="2718867758"/>
+        <p14:creationId xmlns:p14="http://schemas.microsoft.com/office/powerpoint/2010/main" val="1305968961"/>
       </p:ext>
     </p:extLst>
   </p:cSld>
@@ -4780,6 +5309,418 @@
         </p:nvSpPr>
         <p:spPr/>
         <p:txBody>
+          <a:bodyPr>
+            <a:normAutofit fontScale="90000"/>
+          </a:bodyPr>
+          <a:lstStyle/>
+          <a:p>
+            <a:r>
+              <a:rPr lang="en-US" b="1" dirty="0"/>
+              <a:t>Widgets</a:t>
+            </a:r>
+            <a:br>
+              <a:rPr lang="en-US" b="1" dirty="0"/>
+            </a:br>
+            <a:endParaRPr lang="en-US" dirty="0"/>
+          </a:p>
+        </p:txBody>
+      </p:sp>
+      <p:sp>
+        <p:nvSpPr>
+          <p:cNvPr id="3" name="Content Placeholder 2"/>
+          <p:cNvSpPr>
+            <a:spLocks noGrp="1"/>
+          </p:cNvSpPr>
+          <p:nvPr>
+            <p:ph idx="1"/>
+          </p:nvPr>
+        </p:nvSpPr>
+        <p:spPr>
+          <a:xfrm>
+            <a:off x="457200" y="1219200"/>
+            <a:ext cx="8229600" cy="4906963"/>
+          </a:xfrm>
+        </p:spPr>
+        <p:txBody>
+          <a:bodyPr>
+            <a:normAutofit/>
+          </a:bodyPr>
+          <a:lstStyle/>
+          <a:p>
+            <a:pPr marL="0" indent="0">
+              <a:buNone/>
+            </a:pPr>
+            <a:r>
+              <a:rPr lang="en-US" dirty="0" smtClean="0"/>
+              <a:t>A </a:t>
+            </a:r>
+            <a:r>
+              <a:rPr lang="en-US" dirty="0"/>
+              <a:t>widget is a GUI </a:t>
+            </a:r>
+            <a:r>
+              <a:rPr lang="en-US" dirty="0" smtClean="0"/>
+              <a:t>element, like </a:t>
+            </a:r>
+            <a:r>
+              <a:rPr lang="en-US" dirty="0"/>
+              <a:t>buttons, scrollbars, text areas etc.</a:t>
+            </a:r>
+            <a:endParaRPr lang="en-US" dirty="0" smtClean="0"/>
+          </a:p>
+          <a:p>
+            <a:pPr marL="0" indent="0">
+              <a:buNone/>
+            </a:pPr>
+            <a:r>
+              <a:rPr lang="en-US" dirty="0" smtClean="0"/>
+              <a:t>Tk </a:t>
+            </a:r>
+            <a:r>
+              <a:rPr lang="en-US" dirty="0"/>
+              <a:t>comes with a </a:t>
+            </a:r>
+            <a:r>
+              <a:rPr lang="en-US" dirty="0" smtClean="0"/>
+              <a:t>selection of </a:t>
+            </a:r>
+            <a:r>
+              <a:rPr lang="en-US" dirty="0"/>
+              <a:t>basic widgets: </a:t>
+            </a:r>
+            <a:endParaRPr lang="en-US" dirty="0" smtClean="0"/>
+          </a:p>
+          <a:p>
+            <a:pPr marL="0" indent="0">
+              <a:buNone/>
+            </a:pPr>
+            <a:endParaRPr lang="en-US" dirty="0" smtClean="0"/>
+          </a:p>
+          <a:p>
+            <a:pPr marL="0" indent="0">
+              <a:buNone/>
+            </a:pPr>
+            <a:endParaRPr lang="en-US" dirty="0"/>
+          </a:p>
+          <a:p>
+            <a:pPr marL="0" indent="0">
+              <a:buNone/>
+            </a:pPr>
+            <a:r>
+              <a:rPr lang="en-US" dirty="0"/>
+              <a:t>basic widgets – labels, entry </a:t>
+            </a:r>
+            <a:r>
+              <a:rPr lang="en-US" dirty="0" smtClean="0"/>
+              <a:t>widgets, and buttons. </a:t>
+            </a:r>
+            <a:r>
+              <a:rPr lang="en-US" dirty="0" smtClean="0"/>
+              <a:t>These </a:t>
+            </a:r>
+            <a:r>
+              <a:rPr lang="en-US" dirty="0"/>
+              <a:t>can be </a:t>
+            </a:r>
+            <a:r>
+              <a:rPr lang="en-US" dirty="0" smtClean="0"/>
+              <a:t>combined to </a:t>
+            </a:r>
+            <a:r>
+              <a:rPr lang="en-US" dirty="0"/>
+              <a:t>form more complex GUI applications.</a:t>
+            </a:r>
+          </a:p>
+        </p:txBody>
+      </p:sp>
+      <p:sp>
+        <p:nvSpPr>
+          <p:cNvPr id="4" name="TextBox 3"/>
+          <p:cNvSpPr txBox="1"/>
+          <p:nvPr/>
+        </p:nvSpPr>
+        <p:spPr>
+          <a:xfrm>
+            <a:off x="512618" y="2743200"/>
+            <a:ext cx="7924800" cy="2585323"/>
+          </a:xfrm>
+          <a:prstGeom prst="rect">
+            <a:avLst/>
+          </a:prstGeom>
+          <a:noFill/>
+        </p:spPr>
+        <p:txBody>
+          <a:bodyPr wrap="square" numCol="2" rtlCol="0">
+            <a:spAutoFit/>
+          </a:bodyPr>
+          <a:lstStyle/>
+          <a:p>
+            <a:pPr marL="285750" indent="-285750">
+              <a:buFont typeface="Arial" panose="020B0604020202020204" pitchFamily="34" charset="0"/>
+              <a:buChar char="•"/>
+            </a:pPr>
+            <a:r>
+              <a:rPr lang="en-US" sz="2000" dirty="0"/>
+              <a:t>text editing windows</a:t>
+            </a:r>
+          </a:p>
+          <a:p>
+            <a:pPr marL="285750" indent="-285750">
+              <a:buFont typeface="Arial" panose="020B0604020202020204" pitchFamily="34" charset="0"/>
+              <a:buChar char="•"/>
+            </a:pPr>
+            <a:r>
+              <a:rPr lang="en-US" sz="2000" dirty="0"/>
+              <a:t>Sliders</a:t>
+            </a:r>
+          </a:p>
+          <a:p>
+            <a:pPr marL="285750" indent="-285750">
+              <a:buFont typeface="Arial" panose="020B0604020202020204" pitchFamily="34" charset="0"/>
+              <a:buChar char="•"/>
+            </a:pPr>
+            <a:r>
+              <a:rPr lang="en-US" sz="2000" dirty="0"/>
+              <a:t>text entry </a:t>
+            </a:r>
+            <a:r>
+              <a:rPr lang="en-US" sz="2000" dirty="0" smtClean="0"/>
+              <a:t>fields</a:t>
+            </a:r>
+          </a:p>
+          <a:p>
+            <a:pPr marL="285750" indent="-285750">
+              <a:buFont typeface="Arial" panose="020B0604020202020204" pitchFamily="34" charset="0"/>
+              <a:buChar char="•"/>
+            </a:pPr>
+            <a:r>
+              <a:rPr lang="en-US" sz="2000" dirty="0" smtClean="0"/>
+              <a:t>Buttons</a:t>
+            </a:r>
+          </a:p>
+          <a:p>
+            <a:pPr marL="285750" indent="-285750">
+              <a:buFont typeface="Arial" panose="020B0604020202020204" pitchFamily="34" charset="0"/>
+              <a:buChar char="•"/>
+            </a:pPr>
+            <a:endParaRPr lang="en-US" sz="2000" dirty="0"/>
+          </a:p>
+          <a:p>
+            <a:endParaRPr lang="en-US" sz="2000" dirty="0" smtClean="0"/>
+          </a:p>
+          <a:p>
+            <a:pPr marL="285750" indent="-285750">
+              <a:buFont typeface="Arial" panose="020B0604020202020204" pitchFamily="34" charset="0"/>
+              <a:buChar char="•"/>
+            </a:pPr>
+            <a:endParaRPr lang="en-US" sz="2000" dirty="0"/>
+          </a:p>
+          <a:p>
+            <a:endParaRPr lang="en-US" sz="2000" dirty="0" smtClean="0"/>
+          </a:p>
+          <a:p>
+            <a:pPr marL="285750" indent="-285750">
+              <a:buFont typeface="Arial" panose="020B0604020202020204" pitchFamily="34" charset="0"/>
+              <a:buChar char="•"/>
+            </a:pPr>
+            <a:r>
+              <a:rPr lang="en-US" sz="2000" dirty="0" smtClean="0"/>
+              <a:t>Labels</a:t>
+            </a:r>
+            <a:endParaRPr lang="en-US" sz="2000" dirty="0"/>
+          </a:p>
+          <a:p>
+            <a:pPr marL="285750" indent="-285750">
+              <a:buFont typeface="Arial" panose="020B0604020202020204" pitchFamily="34" charset="0"/>
+              <a:buChar char="•"/>
+            </a:pPr>
+            <a:r>
+              <a:rPr lang="en-US" sz="2000" dirty="0"/>
+              <a:t>Menus</a:t>
+            </a:r>
+          </a:p>
+          <a:p>
+            <a:pPr marL="285750" indent="-285750">
+              <a:buFont typeface="Arial" panose="020B0604020202020204" pitchFamily="34" charset="0"/>
+              <a:buChar char="•"/>
+            </a:pPr>
+            <a:r>
+              <a:rPr lang="en-US" sz="2000" dirty="0"/>
+              <a:t>list boxes</a:t>
+            </a:r>
+          </a:p>
+          <a:p>
+            <a:pPr marL="285750" indent="-285750">
+              <a:buFont typeface="Arial" panose="020B0604020202020204" pitchFamily="34" charset="0"/>
+              <a:buChar char="•"/>
+            </a:pPr>
+            <a:r>
+              <a:rPr lang="en-US" sz="2000" dirty="0"/>
+              <a:t>canvas for drawing </a:t>
+            </a:r>
+            <a:r>
+              <a:rPr lang="en-US" sz="2000" dirty="0" smtClean="0"/>
+              <a:t>graphics </a:t>
+            </a:r>
+            <a:endParaRPr lang="en-US" sz="2000" dirty="0"/>
+          </a:p>
+          <a:p>
+            <a:pPr marL="285750" indent="-285750">
+              <a:buFont typeface="Arial" panose="020B0604020202020204" pitchFamily="34" charset="0"/>
+              <a:buChar char="•"/>
+            </a:pPr>
+            <a:endParaRPr lang="en-US" sz="2000" dirty="0"/>
+          </a:p>
+        </p:txBody>
+      </p:sp>
+    </p:spTree>
+    <p:extLst>
+      <p:ext uri="{BB962C8B-B14F-4D97-AF65-F5344CB8AC3E}">
+        <p14:creationId xmlns:p14="http://schemas.microsoft.com/office/powerpoint/2010/main" val="2718867758"/>
+      </p:ext>
+    </p:extLst>
+  </p:cSld>
+  <p:clrMapOvr>
+    <a:masterClrMapping/>
+  </p:clrMapOvr>
+</p:sld>
+</file>
+
+<file path=ppt/slides/slide6.xml><?xml version="1.0" encoding="utf-8"?>
+<p:sld xmlns:a="http://schemas.openxmlformats.org/drawingml/2006/main" xmlns:r="http://schemas.openxmlformats.org/officeDocument/2006/relationships" xmlns:p="http://schemas.openxmlformats.org/presentationml/2006/main">
+  <p:cSld>
+    <p:spTree>
+      <p:nvGrpSpPr>
+        <p:cNvPr id="1" name=""/>
+        <p:cNvGrpSpPr/>
+        <p:nvPr/>
+      </p:nvGrpSpPr>
+      <p:grpSpPr>
+        <a:xfrm>
+          <a:off x="0" y="0"/>
+          <a:ext cx="0" cy="0"/>
+          <a:chOff x="0" y="0"/>
+          <a:chExt cx="0" cy="0"/>
+        </a:xfrm>
+      </p:grpSpPr>
+      <p:sp>
+        <p:nvSpPr>
+          <p:cNvPr id="2" name="TextBox 1"/>
+          <p:cNvSpPr txBox="1"/>
+          <p:nvPr/>
+        </p:nvSpPr>
+        <p:spPr>
+          <a:xfrm>
+            <a:off x="838200" y="685800"/>
+            <a:ext cx="5562600" cy="1938992"/>
+          </a:xfrm>
+          <a:prstGeom prst="rect">
+            <a:avLst/>
+          </a:prstGeom>
+          <a:noFill/>
+        </p:spPr>
+        <p:txBody>
+          <a:bodyPr wrap="square" rtlCol="0">
+            <a:spAutoFit/>
+          </a:bodyPr>
+          <a:lstStyle/>
+          <a:p>
+            <a:r>
+              <a:rPr lang="en-US" sz="2400" b="1" dirty="0" smtClean="0"/>
+              <a:t>Label :    </a:t>
+            </a:r>
+            <a:r>
+              <a:rPr lang="en-US" sz="2400" dirty="0" err="1"/>
+              <a:t>t</a:t>
+            </a:r>
+            <a:r>
+              <a:rPr lang="en-US" sz="2400" dirty="0" err="1" smtClean="0"/>
+              <a:t>tklabel</a:t>
+            </a:r>
+            <a:r>
+              <a:rPr lang="en-US" sz="2400" dirty="0" smtClean="0"/>
+              <a:t>()</a:t>
+            </a:r>
+          </a:p>
+          <a:p>
+            <a:endParaRPr lang="en-US" sz="2400" dirty="0"/>
+          </a:p>
+          <a:p>
+            <a:r>
+              <a:rPr lang="en-US" sz="2400" dirty="0" smtClean="0"/>
+              <a:t>Entry: </a:t>
+            </a:r>
+            <a:r>
+              <a:rPr lang="en-US" sz="2400" dirty="0" err="1" smtClean="0"/>
+              <a:t>tkentry</a:t>
+            </a:r>
+            <a:r>
+              <a:rPr lang="en-US" sz="2400" dirty="0" smtClean="0"/>
+              <a:t>()</a:t>
+            </a:r>
+          </a:p>
+          <a:p>
+            <a:endParaRPr lang="en-US" sz="2400" dirty="0"/>
+          </a:p>
+          <a:p>
+            <a:r>
+              <a:rPr lang="en-US" sz="2400" dirty="0" smtClean="0"/>
+              <a:t>Button: </a:t>
+            </a:r>
+            <a:r>
+              <a:rPr lang="en-US" sz="2400" dirty="0" err="1" smtClean="0"/>
+              <a:t>tkbutton</a:t>
+            </a:r>
+            <a:r>
+              <a:rPr lang="en-US" sz="2400" dirty="0" smtClean="0"/>
+              <a:t>()</a:t>
+            </a:r>
+            <a:endParaRPr lang="en-US" sz="2400" dirty="0"/>
+          </a:p>
+        </p:txBody>
+      </p:sp>
+    </p:spTree>
+    <p:extLst>
+      <p:ext uri="{BB962C8B-B14F-4D97-AF65-F5344CB8AC3E}">
+        <p14:creationId xmlns:p14="http://schemas.microsoft.com/office/powerpoint/2010/main" val="236771599"/>
+      </p:ext>
+    </p:extLst>
+  </p:cSld>
+  <p:clrMapOvr>
+    <a:masterClrMapping/>
+  </p:clrMapOvr>
+</p:sld>
+</file>
+
+<file path=ppt/slides/slide7.xml><?xml version="1.0" encoding="utf-8"?>
+<p:sld xmlns:a="http://schemas.openxmlformats.org/drawingml/2006/main" xmlns:r="http://schemas.openxmlformats.org/officeDocument/2006/relationships" xmlns:p="http://schemas.openxmlformats.org/presentationml/2006/main">
+  <p:cSld>
+    <p:spTree>
+      <p:nvGrpSpPr>
+        <p:cNvPr id="1" name=""/>
+        <p:cNvGrpSpPr/>
+        <p:nvPr/>
+      </p:nvGrpSpPr>
+      <p:grpSpPr>
+        <a:xfrm>
+          <a:off x="0" y="0"/>
+          <a:ext cx="0" cy="0"/>
+          <a:chOff x="0" y="0"/>
+          <a:chExt cx="0" cy="0"/>
+        </a:xfrm>
+      </p:grpSpPr>
+      <p:sp>
+        <p:nvSpPr>
+          <p:cNvPr id="2" name="Title 1"/>
+          <p:cNvSpPr>
+            <a:spLocks noGrp="1"/>
+          </p:cNvSpPr>
+          <p:nvPr>
+            <p:ph type="title"/>
+          </p:nvPr>
+        </p:nvSpPr>
+        <p:spPr/>
+        <p:txBody>
           <a:bodyPr/>
           <a:lstStyle/>
           <a:p>
@@ -4987,7 +5928,7 @@
 </p:sld>
 </file>
 
-<file path=ppt/slides/slide6.xml><?xml version="1.0" encoding="utf-8"?>
+<file path=ppt/slides/slide8.xml><?xml version="1.0" encoding="utf-8"?>
 <p:sld xmlns:a="http://schemas.openxmlformats.org/drawingml/2006/main" xmlns:r="http://schemas.openxmlformats.org/officeDocument/2006/relationships" xmlns:p="http://schemas.openxmlformats.org/presentationml/2006/main">
   <p:cSld>
     <p:spTree>
@@ -5071,7 +6012,7 @@
 </p:sld>
 </file>
 
-<file path=ppt/slides/slide7.xml><?xml version="1.0" encoding="utf-8"?>
+<file path=ppt/slides/slide9.xml><?xml version="1.0" encoding="utf-8"?>
 <p:sld xmlns:a="http://schemas.openxmlformats.org/drawingml/2006/main" xmlns:r="http://schemas.openxmlformats.org/officeDocument/2006/relationships" xmlns:p="http://schemas.openxmlformats.org/presentationml/2006/main">
   <p:cSld>
     <p:spTree>

</xml_diff>